<commit_message>
Update ids and my part of ppt
</commit_message>
<xml_diff>
--- a/UniVerse_Project Front End.pptx
+++ b/UniVerse_Project Front End.pptx
@@ -7,9 +7,12 @@
   <p:sldIdLst>
     <p:sldId id="256" r:id="rId2"/>
     <p:sldId id="271" r:id="rId3"/>
-    <p:sldId id="257" r:id="rId4"/>
-    <p:sldId id="269" r:id="rId5"/>
-    <p:sldId id="270" r:id="rId6"/>
+    <p:sldId id="272" r:id="rId4"/>
+    <p:sldId id="273" r:id="rId5"/>
+    <p:sldId id="274" r:id="rId6"/>
+    <p:sldId id="257" r:id="rId7"/>
+    <p:sldId id="269" r:id="rId8"/>
+    <p:sldId id="270" r:id="rId9"/>
   </p:sldIdLst>
   <p:sldSz cx="12192000" cy="6858000"/>
   <p:notesSz cx="6858000" cy="9144000"/>
@@ -7254,23 +7257,7 @@
               </a:pPr>
               <a:r>
                 <a:rPr lang="en-US" altLang="zh-CN" dirty="0"/>
-                <a:t>Follower/Following</a:t>
-              </a:r>
-              <a:r>
-                <a:rPr lang="zh-CN" altLang="en-US" dirty="0"/>
-                <a:t> </a:t>
-              </a:r>
-              <a:r>
-                <a:rPr lang="en-US" altLang="zh-CN" dirty="0"/>
-                <a:t>manager</a:t>
-              </a:r>
-              <a:r>
-                <a:rPr lang="zh-CN" altLang="en-US" dirty="0"/>
-                <a:t> </a:t>
-              </a:r>
-              <a:r>
-                <a:rPr lang="en-US" altLang="zh-CN" dirty="0"/>
-                <a:t>screen</a:t>
+                <a:t>Home screen</a:t>
               </a:r>
             </a:p>
             <a:p>
@@ -7297,7 +7284,7 @@
               </a:r>
               <a:r>
                 <a:rPr lang="en-US" altLang="zh-CN" kern="1200" dirty="0"/>
-                <a:t>row</a:t>
+                <a:t>grid</a:t>
               </a:r>
               <a:r>
                 <a:rPr lang="zh-CN" altLang="en-US" kern="1200" dirty="0"/>
@@ -7321,15 +7308,7 @@
               </a:r>
               <a:r>
                 <a:rPr lang="en-US" altLang="zh-CN" dirty="0"/>
-                <a:t>follower/following</a:t>
-              </a:r>
-              <a:r>
-                <a:rPr lang="zh-CN" altLang="en-US" dirty="0"/>
-                <a:t> </a:t>
-              </a:r>
-              <a:r>
-                <a:rPr lang="en-US" altLang="zh-CN" dirty="0"/>
-                <a:t>user</a:t>
+                <a:t>event.</a:t>
               </a:r>
             </a:p>
             <a:p>
@@ -7348,31 +7327,7 @@
               </a:pPr>
               <a:r>
                 <a:rPr lang="en-US" altLang="zh-CN" dirty="0"/>
-                <a:t>Chat</a:t>
-              </a:r>
-              <a:r>
-                <a:rPr lang="zh-CN" altLang="en-US" dirty="0"/>
-                <a:t> </a:t>
-              </a:r>
-              <a:r>
-                <a:rPr lang="en-US" altLang="zh-CN" dirty="0"/>
-                <a:t>list</a:t>
-              </a:r>
-              <a:r>
-                <a:rPr lang="zh-CN" altLang="en-US" dirty="0"/>
-                <a:t> </a:t>
-              </a:r>
-              <a:r>
-                <a:rPr lang="en-US" altLang="zh-CN" dirty="0"/>
-                <a:t>manager</a:t>
-              </a:r>
-              <a:r>
-                <a:rPr lang="zh-CN" altLang="en-US" dirty="0"/>
-                <a:t> </a:t>
-              </a:r>
-              <a:r>
-                <a:rPr lang="en-US" altLang="zh-CN" dirty="0"/>
-                <a:t>screen</a:t>
+                <a:t>Event screen</a:t>
               </a:r>
             </a:p>
             <a:p>
@@ -7390,19 +7345,19 @@
                 <a:buChar char="o"/>
               </a:pPr>
               <a:r>
-                <a:rPr lang="en-US" altLang="zh-CN" dirty="0"/>
+                <a:rPr lang="en-US" altLang="zh-CN" kern="1200" dirty="0"/>
                 <a:t>Recycler</a:t>
               </a:r>
               <a:r>
-                <a:rPr lang="zh-CN" altLang="en-US" dirty="0"/>
-                <a:t> </a:t>
-              </a:r>
-              <a:r>
-                <a:rPr lang="en-US" altLang="zh-CN" dirty="0"/>
+                <a:rPr lang="zh-CN" altLang="en-US" kern="1200" dirty="0"/>
+                <a:t> </a:t>
+              </a:r>
+              <a:r>
+                <a:rPr lang="en-US" altLang="zh-CN" kern="1200" dirty="0"/>
                 <a:t>row</a:t>
               </a:r>
               <a:r>
-                <a:rPr lang="zh-CN" altLang="en-US" dirty="0"/>
+                <a:rPr lang="zh-CN" altLang="en-US" kern="1200" dirty="0"/>
                 <a:t> </a:t>
               </a:r>
               <a:r>
@@ -7423,7 +7378,7 @@
               </a:r>
               <a:r>
                 <a:rPr lang="en-US" altLang="zh-CN" dirty="0"/>
-                <a:t>chat</a:t>
+                <a:t>participant.</a:t>
               </a:r>
             </a:p>
             <a:p>
@@ -7441,23 +7396,42 @@
                 <a:buChar char="•"/>
               </a:pPr>
               <a:r>
-                <a:rPr lang="en-US" altLang="zh-CN" kern="1200" dirty="0"/>
-                <a:t>Chat</a:t>
-              </a:r>
-              <a:r>
-                <a:rPr lang="zh-CN" altLang="en-US" kern="1200" dirty="0"/>
-                <a:t> </a:t>
-              </a:r>
-              <a:r>
-                <a:rPr lang="en-US" altLang="zh-CN" kern="1200" dirty="0"/>
-                <a:t>room</a:t>
-              </a:r>
-              <a:r>
-                <a:rPr lang="zh-CN" altLang="en-US" kern="1200" dirty="0"/>
-                <a:t> </a:t>
-              </a:r>
-              <a:r>
-                <a:rPr lang="en-US" altLang="zh-CN" kern="1200" dirty="0"/>
+                <a:rPr lang="en-US" altLang="zh-CN" dirty="0"/>
+                <a:t>Post screen</a:t>
+              </a:r>
+            </a:p>
+            <a:p>
+              <a:pPr marL="342900" lvl="1" indent="-342900" defTabSz="889000">
+                <a:lnSpc>
+                  <a:spcPct val="90000"/>
+                </a:lnSpc>
+                <a:spcBef>
+                  <a:spcPct val="0"/>
+                </a:spcBef>
+                <a:spcAft>
+                  <a:spcPct val="15000"/>
+                </a:spcAft>
+                <a:buFont typeface="Arial" panose="020B0604020202020204" pitchFamily="34" charset="0"/>
+                <a:buChar char="•"/>
+              </a:pPr>
+              <a:r>
+                <a:rPr lang="en-US" altLang="zh-CN" dirty="0"/>
+                <a:t>Follower/Following</a:t>
+              </a:r>
+              <a:r>
+                <a:rPr lang="zh-CN" altLang="en-US" dirty="0"/>
+                <a:t> </a:t>
+              </a:r>
+              <a:r>
+                <a:rPr lang="en-US" altLang="zh-CN" dirty="0"/>
+                <a:t>manager</a:t>
+              </a:r>
+              <a:r>
+                <a:rPr lang="zh-CN" altLang="en-US" dirty="0"/>
+                <a:t> </a:t>
+              </a:r>
+              <a:r>
+                <a:rPr lang="en-US" altLang="zh-CN" dirty="0"/>
                 <a:t>screen</a:t>
               </a:r>
             </a:p>
@@ -7476,6 +7450,108 @@
                 <a:buChar char="o"/>
               </a:pPr>
               <a:r>
+                <a:rPr lang="en-US" altLang="zh-CN" kern="1200" dirty="0"/>
+                <a:t>Recycler</a:t>
+              </a:r>
+              <a:r>
+                <a:rPr lang="zh-CN" altLang="en-US" kern="1200" dirty="0"/>
+                <a:t> </a:t>
+              </a:r>
+              <a:r>
+                <a:rPr lang="en-US" altLang="zh-CN" kern="1200" dirty="0"/>
+                <a:t>row</a:t>
+              </a:r>
+              <a:r>
+                <a:rPr lang="zh-CN" altLang="en-US" kern="1200" dirty="0"/>
+                <a:t> </a:t>
+              </a:r>
+              <a:r>
+                <a:rPr lang="en-US" altLang="zh-CN" dirty="0"/>
+                <a:t>for</a:t>
+              </a:r>
+              <a:r>
+                <a:rPr lang="zh-CN" altLang="en-US" dirty="0"/>
+                <a:t> </a:t>
+              </a:r>
+              <a:r>
+                <a:rPr lang="en-US" altLang="zh-CN" dirty="0"/>
+                <a:t>each</a:t>
+              </a:r>
+              <a:r>
+                <a:rPr lang="zh-CN" altLang="en-US" dirty="0"/>
+                <a:t> </a:t>
+              </a:r>
+              <a:r>
+                <a:rPr lang="en-US" altLang="zh-CN" dirty="0"/>
+                <a:t>follower/following</a:t>
+              </a:r>
+              <a:r>
+                <a:rPr lang="zh-CN" altLang="en-US" dirty="0"/>
+                <a:t> </a:t>
+              </a:r>
+              <a:r>
+                <a:rPr lang="en-US" altLang="zh-CN" dirty="0"/>
+                <a:t>user</a:t>
+              </a:r>
+            </a:p>
+            <a:p>
+              <a:pPr marL="342900" lvl="1" indent="-342900" defTabSz="889000">
+                <a:lnSpc>
+                  <a:spcPct val="90000"/>
+                </a:lnSpc>
+                <a:spcBef>
+                  <a:spcPct val="0"/>
+                </a:spcBef>
+                <a:spcAft>
+                  <a:spcPct val="15000"/>
+                </a:spcAft>
+                <a:buFont typeface="Arial" panose="020B0604020202020204" pitchFamily="34" charset="0"/>
+                <a:buChar char="•"/>
+              </a:pPr>
+              <a:r>
+                <a:rPr lang="en-US" altLang="zh-CN" dirty="0"/>
+                <a:t>Chat</a:t>
+              </a:r>
+              <a:r>
+                <a:rPr lang="zh-CN" altLang="en-US" dirty="0"/>
+                <a:t> </a:t>
+              </a:r>
+              <a:r>
+                <a:rPr lang="en-US" altLang="zh-CN" dirty="0"/>
+                <a:t>list</a:t>
+              </a:r>
+              <a:r>
+                <a:rPr lang="zh-CN" altLang="en-US" dirty="0"/>
+                <a:t> </a:t>
+              </a:r>
+              <a:r>
+                <a:rPr lang="en-US" altLang="zh-CN" dirty="0"/>
+                <a:t>manager</a:t>
+              </a:r>
+              <a:r>
+                <a:rPr lang="zh-CN" altLang="en-US" dirty="0"/>
+                <a:t> </a:t>
+              </a:r>
+              <a:r>
+                <a:rPr lang="en-US" altLang="zh-CN" dirty="0"/>
+                <a:t>screen</a:t>
+              </a:r>
+            </a:p>
+            <a:p>
+              <a:pPr marL="800100" lvl="2" indent="-342900" defTabSz="889000">
+                <a:lnSpc>
+                  <a:spcPct val="90000"/>
+                </a:lnSpc>
+                <a:spcBef>
+                  <a:spcPct val="0"/>
+                </a:spcBef>
+                <a:spcAft>
+                  <a:spcPct val="15000"/>
+                </a:spcAft>
+                <a:buFont typeface="Courier New" panose="02070309020205020404" pitchFamily="49" charset="0"/>
+                <a:buChar char="o"/>
+              </a:pPr>
+              <a:r>
                 <a:rPr lang="en-US" altLang="zh-CN" dirty="0"/>
                 <a:t>Recycler</a:t>
               </a:r>
@@ -7509,6 +7585,92 @@
               </a:r>
               <a:r>
                 <a:rPr lang="en-US" altLang="zh-CN" dirty="0"/>
+                <a:t>chat</a:t>
+              </a:r>
+            </a:p>
+            <a:p>
+              <a:pPr marL="342900" lvl="1" indent="-342900" defTabSz="889000">
+                <a:lnSpc>
+                  <a:spcPct val="90000"/>
+                </a:lnSpc>
+                <a:spcBef>
+                  <a:spcPct val="0"/>
+                </a:spcBef>
+                <a:spcAft>
+                  <a:spcPct val="15000"/>
+                </a:spcAft>
+                <a:buFont typeface="Arial" panose="020B0604020202020204" pitchFamily="34" charset="0"/>
+                <a:buChar char="•"/>
+              </a:pPr>
+              <a:r>
+                <a:rPr lang="en-US" altLang="zh-CN" kern="1200" dirty="0"/>
+                <a:t>Chat</a:t>
+              </a:r>
+              <a:r>
+                <a:rPr lang="zh-CN" altLang="en-US" kern="1200" dirty="0"/>
+                <a:t> </a:t>
+              </a:r>
+              <a:r>
+                <a:rPr lang="en-US" altLang="zh-CN" kern="1200" dirty="0"/>
+                <a:t>room</a:t>
+              </a:r>
+              <a:r>
+                <a:rPr lang="zh-CN" altLang="en-US" kern="1200" dirty="0"/>
+                <a:t> </a:t>
+              </a:r>
+              <a:r>
+                <a:rPr lang="en-US" altLang="zh-CN" kern="1200" dirty="0"/>
+                <a:t>screen</a:t>
+              </a:r>
+            </a:p>
+            <a:p>
+              <a:pPr marL="800100" lvl="2" indent="-342900" defTabSz="889000">
+                <a:lnSpc>
+                  <a:spcPct val="90000"/>
+                </a:lnSpc>
+                <a:spcBef>
+                  <a:spcPct val="0"/>
+                </a:spcBef>
+                <a:spcAft>
+                  <a:spcPct val="15000"/>
+                </a:spcAft>
+                <a:buFont typeface="Courier New" panose="02070309020205020404" pitchFamily="49" charset="0"/>
+                <a:buChar char="o"/>
+              </a:pPr>
+              <a:r>
+                <a:rPr lang="en-US" altLang="zh-CN" dirty="0"/>
+                <a:t>Recycler</a:t>
+              </a:r>
+              <a:r>
+                <a:rPr lang="zh-CN" altLang="en-US" dirty="0"/>
+                <a:t> </a:t>
+              </a:r>
+              <a:r>
+                <a:rPr lang="en-US" altLang="zh-CN" dirty="0"/>
+                <a:t>row</a:t>
+              </a:r>
+              <a:r>
+                <a:rPr lang="zh-CN" altLang="en-US" dirty="0"/>
+                <a:t> </a:t>
+              </a:r>
+              <a:r>
+                <a:rPr lang="en-US" altLang="zh-CN" dirty="0"/>
+                <a:t>for</a:t>
+              </a:r>
+              <a:r>
+                <a:rPr lang="zh-CN" altLang="en-US" dirty="0"/>
+                <a:t> </a:t>
+              </a:r>
+              <a:r>
+                <a:rPr lang="en-US" altLang="zh-CN" dirty="0"/>
+                <a:t>each</a:t>
+              </a:r>
+              <a:r>
+                <a:rPr lang="zh-CN" altLang="en-US" dirty="0"/>
+                <a:t> </a:t>
+              </a:r>
+              <a:r>
+                <a:rPr lang="en-US" altLang="zh-CN" dirty="0"/>
                 <a:t>receiver</a:t>
               </a:r>
               <a:r>
@@ -7535,6 +7697,19 @@
                 <a:rPr lang="en-US" altLang="zh-CN" dirty="0"/>
                 <a:t>message</a:t>
               </a:r>
+            </a:p>
+            <a:p>
+              <a:pPr marL="457200" lvl="2" defTabSz="889000">
+                <a:lnSpc>
+                  <a:spcPct val="90000"/>
+                </a:lnSpc>
+                <a:spcBef>
+                  <a:spcPct val="0"/>
+                </a:spcBef>
+                <a:spcAft>
+                  <a:spcPct val="15000"/>
+                </a:spcAft>
+              </a:pPr>
               <a:endParaRPr lang="en-US" altLang="zh-CN" kern="1200" dirty="0"/>
             </a:p>
           </p:txBody>
@@ -7570,6 +7745,65 @@
           <a:chExt cx="0" cy="0"/>
         </a:xfrm>
       </p:grpSpPr>
+      <p:pic>
+        <p:nvPicPr>
+          <p:cNvPr id="11" name="Picture 10">
+            <a:extLst>
+              <a:ext uri="{FF2B5EF4-FFF2-40B4-BE49-F238E27FC236}">
+                <a16:creationId xmlns:a16="http://schemas.microsoft.com/office/drawing/2014/main" id="{52EEC0C9-9274-FBA1-4FAD-6DDDE454CF6D}"/>
+              </a:ext>
+            </a:extLst>
+          </p:cNvPr>
+          <p:cNvPicPr>
+            <a:picLocks noChangeAspect="1"/>
+          </p:cNvPicPr>
+          <p:nvPr/>
+        </p:nvPicPr>
+        <p:blipFill rotWithShape="1">
+          <a:blip r:embed="rId2"/>
+          <a:srcRect l="1907" r="2229"/>
+          <a:stretch/>
+        </p:blipFill>
+        <p:spPr>
+          <a:xfrm>
+            <a:off x="522517" y="1470962"/>
+            <a:ext cx="2464484" cy="4464714"/>
+          </a:xfrm>
+          <a:prstGeom prst="rect">
+            <a:avLst/>
+          </a:prstGeom>
+        </p:spPr>
+      </p:pic>
+      <p:pic>
+        <p:nvPicPr>
+          <p:cNvPr id="13" name="Picture 12">
+            <a:extLst>
+              <a:ext uri="{FF2B5EF4-FFF2-40B4-BE49-F238E27FC236}">
+                <a16:creationId xmlns:a16="http://schemas.microsoft.com/office/drawing/2014/main" id="{2F6B2147-C225-C213-9FF4-CF9D757770E5}"/>
+              </a:ext>
+            </a:extLst>
+          </p:cNvPr>
+          <p:cNvPicPr>
+            <a:picLocks noChangeAspect="1"/>
+          </p:cNvPicPr>
+          <p:nvPr/>
+        </p:nvPicPr>
+        <p:blipFill>
+          <a:blip r:embed="rId3"/>
+          <a:stretch>
+            <a:fillRect/>
+          </a:stretch>
+        </p:blipFill>
+        <p:spPr>
+          <a:xfrm>
+            <a:off x="3151690" y="1470962"/>
+            <a:ext cx="2513015" cy="4464714"/>
+          </a:xfrm>
+          <a:prstGeom prst="rect">
+            <a:avLst/>
+          </a:prstGeom>
+        </p:spPr>
+      </p:pic>
       <p:sp>
         <p:nvSpPr>
           <p:cNvPr id="2" name="Title 1">
@@ -7593,88 +7827,12 @@
           <a:p>
             <a:r>
               <a:rPr lang="en-US" altLang="zh-CN" dirty="0"/>
-              <a:t>Follower</a:t>
-            </a:r>
-            <a:r>
-              <a:rPr lang="zh-CN" altLang="en-US" dirty="0"/>
-              <a:t> </a:t>
-            </a:r>
-            <a:r>
-              <a:rPr lang="en-US" altLang="zh-CN" dirty="0"/>
-              <a:t>Manager</a:t>
-            </a:r>
-            <a:r>
-              <a:rPr lang="zh-CN" altLang="en-US" dirty="0"/>
-              <a:t> </a:t>
-            </a:r>
-            <a:r>
-              <a:rPr lang="en-US" altLang="zh-CN" dirty="0"/>
-              <a:t>Screen</a:t>
+              <a:t>Home Screen</a:t>
             </a:r>
             <a:endParaRPr lang="en-US" dirty="0"/>
           </a:p>
         </p:txBody>
       </p:sp>
-      <p:pic>
-        <p:nvPicPr>
-          <p:cNvPr id="3" name="Picture 2">
-            <a:extLst>
-              <a:ext uri="{FF2B5EF4-FFF2-40B4-BE49-F238E27FC236}">
-                <a16:creationId xmlns:a16="http://schemas.microsoft.com/office/drawing/2014/main" id="{E288D800-E77B-F8DB-7677-99CC02C7DBD9}"/>
-              </a:ext>
-            </a:extLst>
-          </p:cNvPr>
-          <p:cNvPicPr>
-            <a:picLocks noChangeAspect="1"/>
-          </p:cNvPicPr>
-          <p:nvPr/>
-        </p:nvPicPr>
-        <p:blipFill>
-          <a:blip r:embed="rId2"/>
-          <a:stretch>
-            <a:fillRect/>
-          </a:stretch>
-        </p:blipFill>
-        <p:spPr>
-          <a:xfrm>
-            <a:off x="516007" y="1510748"/>
-            <a:ext cx="2563368" cy="4449064"/>
-          </a:xfrm>
-          <a:prstGeom prst="rect">
-            <a:avLst/>
-          </a:prstGeom>
-        </p:spPr>
-      </p:pic>
-      <p:pic>
-        <p:nvPicPr>
-          <p:cNvPr id="4" name="Picture 3">
-            <a:extLst>
-              <a:ext uri="{FF2B5EF4-FFF2-40B4-BE49-F238E27FC236}">
-                <a16:creationId xmlns:a16="http://schemas.microsoft.com/office/drawing/2014/main" id="{FA9D1664-43D5-3024-7F93-67FBF11FAC59}"/>
-              </a:ext>
-            </a:extLst>
-          </p:cNvPr>
-          <p:cNvPicPr>
-            <a:picLocks noChangeAspect="1"/>
-          </p:cNvPicPr>
-          <p:nvPr/>
-        </p:nvPicPr>
-        <p:blipFill>
-          <a:blip r:embed="rId3"/>
-          <a:stretch>
-            <a:fillRect/>
-          </a:stretch>
-        </p:blipFill>
-        <p:spPr>
-          <a:xfrm>
-            <a:off x="3417924" y="1470962"/>
-            <a:ext cx="2562461" cy="4488850"/>
-          </a:xfrm>
-          <a:prstGeom prst="rect">
-            <a:avLst/>
-          </a:prstGeom>
-        </p:spPr>
-      </p:pic>
       <p:sp>
         <p:nvSpPr>
           <p:cNvPr id="5" name="TextBox 4">
@@ -7689,7 +7847,7 @@
         </p:nvSpPr>
         <p:spPr>
           <a:xfrm>
-            <a:off x="925901" y="3646950"/>
+            <a:off x="1081675" y="2579369"/>
             <a:ext cx="1515640" cy="369332"/>
           </a:xfrm>
           <a:prstGeom prst="rect">
@@ -7733,7 +7891,7 @@
         </p:nvSpPr>
         <p:spPr>
           <a:xfrm>
-            <a:off x="3849968" y="3646950"/>
+            <a:off x="3624694" y="3653553"/>
             <a:ext cx="1699494" cy="646331"/>
           </a:xfrm>
           <a:prstGeom prst="rect">
@@ -7962,7 +8120,7 @@
               </a:r>
               <a:r>
                 <a:rPr lang="en-US" altLang="zh-CN" sz="2000" kern="1200" dirty="0"/>
-                <a:t>Follower/Following</a:t>
+                <a:t>home screen,</a:t>
               </a:r>
               <a:r>
                 <a:rPr lang="zh-CN" altLang="en-US" sz="2000" kern="1200" dirty="0"/>
@@ -7970,31 +8128,23 @@
               </a:r>
               <a:r>
                 <a:rPr lang="en-US" altLang="zh-CN" sz="2000" kern="1200" dirty="0"/>
-                <a:t>manager</a:t>
-              </a:r>
-              <a:r>
-                <a:rPr lang="zh-CN" altLang="en-US" sz="2000" kern="1200" dirty="0"/>
-                <a:t> </a:t>
+                <a:t>which contains </a:t>
+              </a:r>
+              <a:r>
+                <a:rPr lang="en-US" altLang="zh-CN" sz="2000" dirty="0"/>
+                <a:t>2 column </a:t>
               </a:r>
               <a:r>
                 <a:rPr lang="en-US" altLang="zh-CN" sz="2000" kern="1200" dirty="0"/>
-                <a:t>screen,</a:t>
-              </a:r>
-              <a:r>
-                <a:rPr lang="zh-CN" altLang="en-US" sz="2000" kern="1200" dirty="0"/>
-                <a:t> </a:t>
+                <a:t>of </a:t>
+              </a:r>
+              <a:r>
+                <a:rPr lang="en-US" altLang="zh-CN" sz="2000" dirty="0"/>
+                <a:t>events and essential buttons to navigate to different pages</a:t>
               </a:r>
               <a:r>
                 <a:rPr lang="en-US" altLang="zh-CN" sz="2000" kern="1200" dirty="0"/>
-                <a:t>which contains a list of followers/following</a:t>
-              </a:r>
-              <a:r>
-                <a:rPr lang="zh-CN" altLang="en-US" sz="2000" kern="1200" dirty="0"/>
-                <a:t> </a:t>
-              </a:r>
-              <a:r>
-                <a:rPr lang="en-US" altLang="zh-CN" sz="2000" kern="1200" dirty="0"/>
-                <a:t>users. </a:t>
+                <a:t>. </a:t>
               </a:r>
             </a:p>
             <a:p>
@@ -8027,6 +8177,1269 @@
               </a:pPr>
               <a:r>
                 <a:rPr lang="en-US" altLang="zh-CN" sz="2000" kern="1200" dirty="0"/>
+                <a:t>We will build the participant </a:t>
+              </a:r>
+              <a:r>
+                <a:rPr lang="en-US" altLang="zh-CN" sz="2000" dirty="0"/>
+                <a:t>list </a:t>
+              </a:r>
+              <a:r>
+                <a:rPr lang="en-US" altLang="zh-CN" sz="2000" kern="1200" dirty="0"/>
+                <a:t>using </a:t>
+              </a:r>
+              <a:r>
+                <a:rPr lang="en-US" altLang="zh-CN" sz="2000" kern="1200" dirty="0" err="1"/>
+                <a:t>RecyclerView</a:t>
+              </a:r>
+              <a:r>
+                <a:rPr lang="en-US" altLang="zh-CN" sz="2000" kern="1200" dirty="0"/>
+                <a:t>. Each grid of the </a:t>
+              </a:r>
+              <a:r>
+                <a:rPr lang="en-US" altLang="zh-CN" sz="2000" kern="1200" dirty="0" err="1"/>
+                <a:t>RecyclerView</a:t>
+              </a:r>
+              <a:r>
+                <a:rPr lang="en-US" altLang="zh-CN" sz="2000" kern="1200" dirty="0"/>
+                <a:t> is rendered from the Layout home_events_recycler_row.xml. </a:t>
+              </a:r>
+            </a:p>
+          </p:txBody>
+        </p:sp>
+      </p:grpSp>
+    </p:spTree>
+    <p:extLst>
+      <p:ext uri="{BB962C8B-B14F-4D97-AF65-F5344CB8AC3E}">
+        <p14:creationId xmlns:p14="http://schemas.microsoft.com/office/powerpoint/2010/main" val="3248067433"/>
+      </p:ext>
+    </p:extLst>
+  </p:cSld>
+  <p:clrMapOvr>
+    <a:masterClrMapping/>
+  </p:clrMapOvr>
+</p:sld>
+</file>
+
+<file path=ppt/slides/slide4.xml><?xml version="1.0" encoding="utf-8"?>
+<p:sld xmlns:a="http://schemas.openxmlformats.org/drawingml/2006/main" xmlns:r="http://schemas.openxmlformats.org/officeDocument/2006/relationships" xmlns:p="http://schemas.openxmlformats.org/presentationml/2006/main">
+  <p:cSld>
+    <p:spTree>
+      <p:nvGrpSpPr>
+        <p:cNvPr id="1" name=""/>
+        <p:cNvGrpSpPr/>
+        <p:nvPr/>
+      </p:nvGrpSpPr>
+      <p:grpSpPr>
+        <a:xfrm>
+          <a:off x="0" y="0"/>
+          <a:ext cx="0" cy="0"/>
+          <a:chOff x="0" y="0"/>
+          <a:chExt cx="0" cy="0"/>
+        </a:xfrm>
+      </p:grpSpPr>
+      <p:pic>
+        <p:nvPicPr>
+          <p:cNvPr id="12" name="Picture 11">
+            <a:extLst>
+              <a:ext uri="{FF2B5EF4-FFF2-40B4-BE49-F238E27FC236}">
+                <a16:creationId xmlns:a16="http://schemas.microsoft.com/office/drawing/2014/main" id="{F59A8384-0DDC-B8D3-0BDF-68C3C8F1952D}"/>
+              </a:ext>
+            </a:extLst>
+          </p:cNvPr>
+          <p:cNvPicPr>
+            <a:picLocks noChangeAspect="1"/>
+          </p:cNvPicPr>
+          <p:nvPr/>
+        </p:nvPicPr>
+        <p:blipFill rotWithShape="1">
+          <a:blip r:embed="rId2"/>
+          <a:srcRect t="74"/>
+          <a:stretch/>
+        </p:blipFill>
+        <p:spPr>
+          <a:xfrm>
+            <a:off x="3325823" y="1490855"/>
+            <a:ext cx="2494810" cy="4444821"/>
+          </a:xfrm>
+          <a:prstGeom prst="rect">
+            <a:avLst/>
+          </a:prstGeom>
+        </p:spPr>
+      </p:pic>
+      <p:pic>
+        <p:nvPicPr>
+          <p:cNvPr id="4" name="Picture 3">
+            <a:extLst>
+              <a:ext uri="{FF2B5EF4-FFF2-40B4-BE49-F238E27FC236}">
+                <a16:creationId xmlns:a16="http://schemas.microsoft.com/office/drawing/2014/main" id="{D92B1047-0932-817E-9375-2A7E7BEB93FF}"/>
+              </a:ext>
+            </a:extLst>
+          </p:cNvPr>
+          <p:cNvPicPr>
+            <a:picLocks noChangeAspect="1"/>
+          </p:cNvPicPr>
+          <p:nvPr/>
+        </p:nvPicPr>
+        <p:blipFill>
+          <a:blip r:embed="rId3"/>
+          <a:stretch>
+            <a:fillRect/>
+          </a:stretch>
+        </p:blipFill>
+        <p:spPr>
+          <a:xfrm>
+            <a:off x="359709" y="1470962"/>
+            <a:ext cx="2502317" cy="4464714"/>
+          </a:xfrm>
+          <a:prstGeom prst="rect">
+            <a:avLst/>
+          </a:prstGeom>
+        </p:spPr>
+      </p:pic>
+      <p:sp>
+        <p:nvSpPr>
+          <p:cNvPr id="2" name="Title 1">
+            <a:extLst>
+              <a:ext uri="{FF2B5EF4-FFF2-40B4-BE49-F238E27FC236}">
+                <a16:creationId xmlns:a16="http://schemas.microsoft.com/office/drawing/2014/main" id="{C46C4826-3193-197F-1BB3-C6D9998AAD1D}"/>
+              </a:ext>
+            </a:extLst>
+          </p:cNvPr>
+          <p:cNvSpPr>
+            <a:spLocks noGrp="1"/>
+          </p:cNvSpPr>
+          <p:nvPr>
+            <p:ph type="title"/>
+          </p:nvPr>
+        </p:nvSpPr>
+        <p:spPr/>
+        <p:txBody>
+          <a:bodyPr/>
+          <a:lstStyle/>
+          <a:p>
+            <a:r>
+              <a:rPr lang="en-US" altLang="zh-CN" dirty="0"/>
+              <a:t>Event Screen</a:t>
+            </a:r>
+            <a:endParaRPr lang="en-US" dirty="0"/>
+          </a:p>
+        </p:txBody>
+      </p:sp>
+      <p:sp>
+        <p:nvSpPr>
+          <p:cNvPr id="5" name="TextBox 4">
+            <a:extLst>
+              <a:ext uri="{FF2B5EF4-FFF2-40B4-BE49-F238E27FC236}">
+                <a16:creationId xmlns:a16="http://schemas.microsoft.com/office/drawing/2014/main" id="{642C62AF-0C69-5A86-0980-3958039E843D}"/>
+              </a:ext>
+            </a:extLst>
+          </p:cNvPr>
+          <p:cNvSpPr txBox="1"/>
+          <p:nvPr/>
+        </p:nvSpPr>
+        <p:spPr>
+          <a:xfrm>
+            <a:off x="733398" y="5202372"/>
+            <a:ext cx="1515640" cy="369332"/>
+          </a:xfrm>
+          <a:prstGeom prst="rect">
+            <a:avLst/>
+          </a:prstGeom>
+          <a:noFill/>
+        </p:spPr>
+        <p:txBody>
+          <a:bodyPr wrap="square" rtlCol="0">
+            <a:spAutoFit/>
+          </a:bodyPr>
+          <a:lstStyle/>
+          <a:p>
+            <a:r>
+              <a:rPr lang="en-US" altLang="zh-CN" dirty="0"/>
+              <a:t>Recycler</a:t>
+            </a:r>
+            <a:r>
+              <a:rPr lang="zh-CN" altLang="en-US" dirty="0"/>
+              <a:t> </a:t>
+            </a:r>
+            <a:r>
+              <a:rPr lang="en-US" altLang="zh-CN" dirty="0"/>
+              <a:t>View</a:t>
+            </a:r>
+            <a:endParaRPr lang="en-US" dirty="0"/>
+          </a:p>
+        </p:txBody>
+      </p:sp>
+      <p:sp>
+        <p:nvSpPr>
+          <p:cNvPr id="6" name="TextBox 5">
+            <a:extLst>
+              <a:ext uri="{FF2B5EF4-FFF2-40B4-BE49-F238E27FC236}">
+                <a16:creationId xmlns:a16="http://schemas.microsoft.com/office/drawing/2014/main" id="{13A3636C-5410-69D8-A108-6CDC5C5254CC}"/>
+              </a:ext>
+            </a:extLst>
+          </p:cNvPr>
+          <p:cNvSpPr txBox="1"/>
+          <p:nvPr/>
+        </p:nvSpPr>
+        <p:spPr>
+          <a:xfrm>
+            <a:off x="3728211" y="2979697"/>
+            <a:ext cx="1699494" cy="646331"/>
+          </a:xfrm>
+          <a:prstGeom prst="rect">
+            <a:avLst/>
+          </a:prstGeom>
+          <a:noFill/>
+        </p:spPr>
+        <p:txBody>
+          <a:bodyPr wrap="square" rtlCol="0">
+            <a:spAutoFit/>
+          </a:bodyPr>
+          <a:lstStyle/>
+          <a:p>
+            <a:r>
+              <a:rPr lang="en-US" altLang="zh-CN" dirty="0"/>
+              <a:t>One</a:t>
+            </a:r>
+            <a:r>
+              <a:rPr lang="zh-CN" altLang="en-US" dirty="0"/>
+              <a:t> </a:t>
+            </a:r>
+            <a:r>
+              <a:rPr lang="en-US" altLang="zh-CN" dirty="0"/>
+              <a:t>row</a:t>
+            </a:r>
+            <a:r>
+              <a:rPr lang="zh-CN" altLang="en-US" dirty="0"/>
+              <a:t> </a:t>
+            </a:r>
+            <a:r>
+              <a:rPr lang="en-US" altLang="zh-CN" dirty="0"/>
+              <a:t>in</a:t>
+            </a:r>
+            <a:r>
+              <a:rPr lang="zh-CN" altLang="en-US" dirty="0"/>
+              <a:t> </a:t>
+            </a:r>
+            <a:r>
+              <a:rPr lang="en-US" altLang="zh-CN" dirty="0"/>
+              <a:t>the</a:t>
+            </a:r>
+            <a:r>
+              <a:rPr lang="zh-CN" altLang="en-US" dirty="0"/>
+              <a:t> </a:t>
+            </a:r>
+            <a:r>
+              <a:rPr lang="en-US" altLang="zh-CN" dirty="0"/>
+              <a:t>Recycler</a:t>
+            </a:r>
+            <a:r>
+              <a:rPr lang="zh-CN" altLang="en-US" dirty="0"/>
+              <a:t> </a:t>
+            </a:r>
+            <a:r>
+              <a:rPr lang="en-US" altLang="zh-CN" dirty="0"/>
+              <a:t>View</a:t>
+            </a:r>
+            <a:endParaRPr lang="en-US" dirty="0"/>
+          </a:p>
+        </p:txBody>
+      </p:sp>
+      <p:grpSp>
+        <p:nvGrpSpPr>
+          <p:cNvPr id="7" name="Group 6">
+            <a:extLst>
+              <a:ext uri="{FF2B5EF4-FFF2-40B4-BE49-F238E27FC236}">
+                <a16:creationId xmlns:a16="http://schemas.microsoft.com/office/drawing/2014/main" id="{A22A1D45-7F4E-FEA6-CF2F-6FE7F0F2E71D}"/>
+              </a:ext>
+            </a:extLst>
+          </p:cNvPr>
+          <p:cNvGrpSpPr/>
+          <p:nvPr/>
+        </p:nvGrpSpPr>
+        <p:grpSpPr>
+          <a:xfrm>
+            <a:off x="6400973" y="1490855"/>
+            <a:ext cx="5159461" cy="4449064"/>
+            <a:chOff x="2539" y="1777233"/>
+            <a:chExt cx="2476500" cy="2854800"/>
+          </a:xfrm>
+        </p:grpSpPr>
+        <p:sp>
+          <p:nvSpPr>
+            <p:cNvPr id="8" name="Rectangle 7">
+              <a:extLst>
+                <a:ext uri="{FF2B5EF4-FFF2-40B4-BE49-F238E27FC236}">
+                  <a16:creationId xmlns:a16="http://schemas.microsoft.com/office/drawing/2014/main" id="{64914826-C500-B00A-8AD5-5F496EE39C0F}"/>
+                </a:ext>
+              </a:extLst>
+            </p:cNvPr>
+            <p:cNvSpPr/>
+            <p:nvPr/>
+          </p:nvSpPr>
+          <p:spPr>
+            <a:xfrm>
+              <a:off x="2539" y="1777233"/>
+              <a:ext cx="2476500" cy="2854800"/>
+            </a:xfrm>
+            <a:prstGeom prst="rect">
+              <a:avLst/>
+            </a:prstGeom>
+          </p:spPr>
+          <p:style>
+            <a:lnRef idx="2">
+              <a:schemeClr val="accent1">
+                <a:alpha val="90000"/>
+                <a:tint val="40000"/>
+                <a:hueOff val="0"/>
+                <a:satOff val="0"/>
+                <a:lumOff val="0"/>
+                <a:alphaOff val="0"/>
+              </a:schemeClr>
+            </a:lnRef>
+            <a:fillRef idx="1">
+              <a:schemeClr val="accent1">
+                <a:alpha val="90000"/>
+                <a:tint val="40000"/>
+                <a:hueOff val="0"/>
+                <a:satOff val="0"/>
+                <a:lumOff val="0"/>
+                <a:alphaOff val="0"/>
+              </a:schemeClr>
+            </a:fillRef>
+            <a:effectRef idx="0">
+              <a:schemeClr val="accent1">
+                <a:alpha val="90000"/>
+                <a:tint val="40000"/>
+                <a:hueOff val="0"/>
+                <a:satOff val="0"/>
+                <a:lumOff val="0"/>
+                <a:alphaOff val="0"/>
+              </a:schemeClr>
+            </a:effectRef>
+            <a:fontRef idx="minor">
+              <a:schemeClr val="dk1">
+                <a:hueOff val="0"/>
+                <a:satOff val="0"/>
+                <a:lumOff val="0"/>
+                <a:alphaOff val="0"/>
+              </a:schemeClr>
+            </a:fontRef>
+          </p:style>
+        </p:sp>
+        <p:sp>
+          <p:nvSpPr>
+            <p:cNvPr id="9" name="TextBox 8">
+              <a:extLst>
+                <a:ext uri="{FF2B5EF4-FFF2-40B4-BE49-F238E27FC236}">
+                  <a16:creationId xmlns:a16="http://schemas.microsoft.com/office/drawing/2014/main" id="{CEC59AB9-40CC-EAC0-F975-7D628F4B34AF}"/>
+                </a:ext>
+              </a:extLst>
+            </p:cNvPr>
+            <p:cNvSpPr txBox="1"/>
+            <p:nvPr/>
+          </p:nvSpPr>
+          <p:spPr>
+            <a:xfrm>
+              <a:off x="2539" y="1777233"/>
+              <a:ext cx="2476500" cy="2854800"/>
+            </a:xfrm>
+            <a:prstGeom prst="rect">
+              <a:avLst/>
+            </a:prstGeom>
+          </p:spPr>
+          <p:style>
+            <a:lnRef idx="0">
+              <a:scrgbClr r="0" g="0" b="0"/>
+            </a:lnRef>
+            <a:fillRef idx="0">
+              <a:scrgbClr r="0" g="0" b="0"/>
+            </a:fillRef>
+            <a:effectRef idx="0">
+              <a:scrgbClr r="0" g="0" b="0"/>
+            </a:effectRef>
+            <a:fontRef idx="minor">
+              <a:schemeClr val="dk1">
+                <a:hueOff val="0"/>
+                <a:satOff val="0"/>
+                <a:lumOff val="0"/>
+                <a:alphaOff val="0"/>
+              </a:schemeClr>
+            </a:fontRef>
+          </p:style>
+          <p:txBody>
+            <a:bodyPr spcFirstLastPara="0" vert="horz" wrap="square" lIns="106680" tIns="106680" rIns="142240" bIns="160020" numCol="1" spcCol="1270" anchor="t" anchorCtr="0">
+              <a:noAutofit/>
+            </a:bodyPr>
+            <a:lstStyle/>
+            <a:p>
+              <a:pPr marL="342900" lvl="1" indent="-342900" defTabSz="889000">
+                <a:lnSpc>
+                  <a:spcPct val="90000"/>
+                </a:lnSpc>
+                <a:spcBef>
+                  <a:spcPct val="0"/>
+                </a:spcBef>
+                <a:spcAft>
+                  <a:spcPct val="15000"/>
+                </a:spcAft>
+                <a:buFont typeface="Arial" panose="020B0604020202020204" pitchFamily="34" charset="0"/>
+                <a:buChar char="•"/>
+              </a:pPr>
+              <a:r>
+                <a:rPr lang="en-US" altLang="zh-CN" sz="2000" kern="1200" dirty="0"/>
+                <a:t>This</a:t>
+              </a:r>
+              <a:r>
+                <a:rPr lang="zh-CN" altLang="en-US" sz="2000" kern="1200" dirty="0"/>
+                <a:t> </a:t>
+              </a:r>
+              <a:r>
+                <a:rPr lang="en-US" altLang="zh-CN" sz="2000" kern="1200" dirty="0"/>
+                <a:t>is</a:t>
+              </a:r>
+              <a:r>
+                <a:rPr lang="zh-CN" altLang="en-US" sz="2000" kern="1200" dirty="0"/>
+                <a:t> </a:t>
+              </a:r>
+              <a:r>
+                <a:rPr lang="en-US" altLang="zh-CN" sz="2000" kern="1200" dirty="0"/>
+                <a:t>the</a:t>
+              </a:r>
+              <a:r>
+                <a:rPr lang="zh-CN" altLang="en-US" sz="2000" kern="1200" dirty="0"/>
+                <a:t> </a:t>
+              </a:r>
+              <a:r>
+                <a:rPr lang="en-US" altLang="zh-CN" sz="2000" kern="1200" dirty="0"/>
+                <a:t>event screen,</a:t>
+              </a:r>
+              <a:r>
+                <a:rPr lang="zh-CN" altLang="en-US" sz="2000" kern="1200" dirty="0"/>
+                <a:t> </a:t>
+              </a:r>
+              <a:r>
+                <a:rPr lang="en-US" altLang="zh-CN" sz="2000" kern="1200" dirty="0"/>
+                <a:t>which includes information of an event, a list of participants, and buttons to interact with the event.</a:t>
+              </a:r>
+            </a:p>
+            <a:p>
+              <a:pPr marL="0" lvl="1" defTabSz="889000">
+                <a:lnSpc>
+                  <a:spcPct val="90000"/>
+                </a:lnSpc>
+                <a:spcBef>
+                  <a:spcPct val="0"/>
+                </a:spcBef>
+                <a:spcAft>
+                  <a:spcPct val="15000"/>
+                </a:spcAft>
+              </a:pPr>
+              <a:endParaRPr lang="en-US" altLang="zh-CN" sz="2000" kern="1200" dirty="0"/>
+            </a:p>
+            <a:p>
+              <a:pPr marL="342900" lvl="1" indent="-342900" defTabSz="889000">
+                <a:lnSpc>
+                  <a:spcPct val="90000"/>
+                </a:lnSpc>
+                <a:spcBef>
+                  <a:spcPct val="0"/>
+                </a:spcBef>
+                <a:spcAft>
+                  <a:spcPct val="15000"/>
+                </a:spcAft>
+                <a:buFont typeface="Arial" panose="020B0604020202020204" pitchFamily="34" charset="0"/>
+                <a:buChar char="•"/>
+              </a:pPr>
+              <a:r>
+                <a:rPr lang="en-US" altLang="zh-CN" sz="2000" kern="1200" dirty="0"/>
+                <a:t>We will build the participant list using </a:t>
+              </a:r>
+              <a:r>
+                <a:rPr lang="en-US" altLang="zh-CN" sz="2000" kern="1200" dirty="0" err="1"/>
+                <a:t>RecyclerView</a:t>
+              </a:r>
+              <a:r>
+                <a:rPr lang="en-US" altLang="zh-CN" sz="2000" kern="1200" dirty="0"/>
+                <a:t>. Each row of the </a:t>
+              </a:r>
+              <a:r>
+                <a:rPr lang="en-US" altLang="zh-CN" sz="2000" kern="1200" dirty="0" err="1"/>
+                <a:t>RecyclerView</a:t>
+              </a:r>
+              <a:r>
+                <a:rPr lang="en-US" altLang="zh-CN" sz="2000" kern="1200" dirty="0"/>
+                <a:t> is rendered from the Layout participant_recycler_row.xml. </a:t>
+              </a:r>
+            </a:p>
+          </p:txBody>
+        </p:sp>
+      </p:grpSp>
+    </p:spTree>
+    <p:extLst>
+      <p:ext uri="{BB962C8B-B14F-4D97-AF65-F5344CB8AC3E}">
+        <p14:creationId xmlns:p14="http://schemas.microsoft.com/office/powerpoint/2010/main" val="1752988168"/>
+      </p:ext>
+    </p:extLst>
+  </p:cSld>
+  <p:clrMapOvr>
+    <a:masterClrMapping/>
+  </p:clrMapOvr>
+</p:sld>
+</file>
+
+<file path=ppt/slides/slide5.xml><?xml version="1.0" encoding="utf-8"?>
+<p:sld xmlns:a="http://schemas.openxmlformats.org/drawingml/2006/main" xmlns:r="http://schemas.openxmlformats.org/officeDocument/2006/relationships" xmlns:p="http://schemas.openxmlformats.org/presentationml/2006/main">
+  <p:cSld>
+    <p:spTree>
+      <p:nvGrpSpPr>
+        <p:cNvPr id="1" name=""/>
+        <p:cNvGrpSpPr/>
+        <p:nvPr/>
+      </p:nvGrpSpPr>
+      <p:grpSpPr>
+        <a:xfrm>
+          <a:off x="0" y="0"/>
+          <a:ext cx="0" cy="0"/>
+          <a:chOff x="0" y="0"/>
+          <a:chExt cx="0" cy="0"/>
+        </a:xfrm>
+      </p:grpSpPr>
+      <p:pic>
+        <p:nvPicPr>
+          <p:cNvPr id="4" name="Picture 3">
+            <a:extLst>
+              <a:ext uri="{FF2B5EF4-FFF2-40B4-BE49-F238E27FC236}">
+                <a16:creationId xmlns:a16="http://schemas.microsoft.com/office/drawing/2014/main" id="{A5087114-E889-E03B-0732-884980236C8D}"/>
+              </a:ext>
+            </a:extLst>
+          </p:cNvPr>
+          <p:cNvPicPr>
+            <a:picLocks noChangeAspect="1"/>
+          </p:cNvPicPr>
+          <p:nvPr/>
+        </p:nvPicPr>
+        <p:blipFill>
+          <a:blip r:embed="rId2"/>
+          <a:stretch>
+            <a:fillRect/>
+          </a:stretch>
+        </p:blipFill>
+        <p:spPr>
+          <a:xfrm>
+            <a:off x="1314318" y="1437522"/>
+            <a:ext cx="2512008" cy="4464714"/>
+          </a:xfrm>
+          <a:prstGeom prst="rect">
+            <a:avLst/>
+          </a:prstGeom>
+        </p:spPr>
+      </p:pic>
+      <p:sp>
+        <p:nvSpPr>
+          <p:cNvPr id="2" name="Title 1">
+            <a:extLst>
+              <a:ext uri="{FF2B5EF4-FFF2-40B4-BE49-F238E27FC236}">
+                <a16:creationId xmlns:a16="http://schemas.microsoft.com/office/drawing/2014/main" id="{C46C4826-3193-197F-1BB3-C6D9998AAD1D}"/>
+              </a:ext>
+            </a:extLst>
+          </p:cNvPr>
+          <p:cNvSpPr>
+            <a:spLocks noGrp="1"/>
+          </p:cNvSpPr>
+          <p:nvPr>
+            <p:ph type="title"/>
+          </p:nvPr>
+        </p:nvSpPr>
+        <p:spPr/>
+        <p:txBody>
+          <a:bodyPr/>
+          <a:lstStyle/>
+          <a:p>
+            <a:r>
+              <a:rPr lang="en-US" altLang="zh-CN" dirty="0"/>
+              <a:t>Post Screen</a:t>
+            </a:r>
+            <a:endParaRPr lang="en-US" dirty="0"/>
+          </a:p>
+        </p:txBody>
+      </p:sp>
+      <p:grpSp>
+        <p:nvGrpSpPr>
+          <p:cNvPr id="7" name="Group 6">
+            <a:extLst>
+              <a:ext uri="{FF2B5EF4-FFF2-40B4-BE49-F238E27FC236}">
+                <a16:creationId xmlns:a16="http://schemas.microsoft.com/office/drawing/2014/main" id="{A22A1D45-7F4E-FEA6-CF2F-6FE7F0F2E71D}"/>
+              </a:ext>
+            </a:extLst>
+          </p:cNvPr>
+          <p:cNvGrpSpPr/>
+          <p:nvPr/>
+        </p:nvGrpSpPr>
+        <p:grpSpPr>
+          <a:xfrm>
+            <a:off x="6400973" y="1490855"/>
+            <a:ext cx="5159461" cy="4449064"/>
+            <a:chOff x="2539" y="1777233"/>
+            <a:chExt cx="2476500" cy="2854800"/>
+          </a:xfrm>
+        </p:grpSpPr>
+        <p:sp>
+          <p:nvSpPr>
+            <p:cNvPr id="8" name="Rectangle 7">
+              <a:extLst>
+                <a:ext uri="{FF2B5EF4-FFF2-40B4-BE49-F238E27FC236}">
+                  <a16:creationId xmlns:a16="http://schemas.microsoft.com/office/drawing/2014/main" id="{64914826-C500-B00A-8AD5-5F496EE39C0F}"/>
+                </a:ext>
+              </a:extLst>
+            </p:cNvPr>
+            <p:cNvSpPr/>
+            <p:nvPr/>
+          </p:nvSpPr>
+          <p:spPr>
+            <a:xfrm>
+              <a:off x="2539" y="1777233"/>
+              <a:ext cx="2476500" cy="2854800"/>
+            </a:xfrm>
+            <a:prstGeom prst="rect">
+              <a:avLst/>
+            </a:prstGeom>
+          </p:spPr>
+          <p:style>
+            <a:lnRef idx="2">
+              <a:schemeClr val="accent1">
+                <a:alpha val="90000"/>
+                <a:tint val="40000"/>
+                <a:hueOff val="0"/>
+                <a:satOff val="0"/>
+                <a:lumOff val="0"/>
+                <a:alphaOff val="0"/>
+              </a:schemeClr>
+            </a:lnRef>
+            <a:fillRef idx="1">
+              <a:schemeClr val="accent1">
+                <a:alpha val="90000"/>
+                <a:tint val="40000"/>
+                <a:hueOff val="0"/>
+                <a:satOff val="0"/>
+                <a:lumOff val="0"/>
+                <a:alphaOff val="0"/>
+              </a:schemeClr>
+            </a:fillRef>
+            <a:effectRef idx="0">
+              <a:schemeClr val="accent1">
+                <a:alpha val="90000"/>
+                <a:tint val="40000"/>
+                <a:hueOff val="0"/>
+                <a:satOff val="0"/>
+                <a:lumOff val="0"/>
+                <a:alphaOff val="0"/>
+              </a:schemeClr>
+            </a:effectRef>
+            <a:fontRef idx="minor">
+              <a:schemeClr val="dk1">
+                <a:hueOff val="0"/>
+                <a:satOff val="0"/>
+                <a:lumOff val="0"/>
+                <a:alphaOff val="0"/>
+              </a:schemeClr>
+            </a:fontRef>
+          </p:style>
+        </p:sp>
+        <p:sp>
+          <p:nvSpPr>
+            <p:cNvPr id="9" name="TextBox 8">
+              <a:extLst>
+                <a:ext uri="{FF2B5EF4-FFF2-40B4-BE49-F238E27FC236}">
+                  <a16:creationId xmlns:a16="http://schemas.microsoft.com/office/drawing/2014/main" id="{CEC59AB9-40CC-EAC0-F975-7D628F4B34AF}"/>
+                </a:ext>
+              </a:extLst>
+            </p:cNvPr>
+            <p:cNvSpPr txBox="1"/>
+            <p:nvPr/>
+          </p:nvSpPr>
+          <p:spPr>
+            <a:xfrm>
+              <a:off x="2539" y="1777233"/>
+              <a:ext cx="2476500" cy="2854800"/>
+            </a:xfrm>
+            <a:prstGeom prst="rect">
+              <a:avLst/>
+            </a:prstGeom>
+          </p:spPr>
+          <p:style>
+            <a:lnRef idx="0">
+              <a:scrgbClr r="0" g="0" b="0"/>
+            </a:lnRef>
+            <a:fillRef idx="0">
+              <a:scrgbClr r="0" g="0" b="0"/>
+            </a:fillRef>
+            <a:effectRef idx="0">
+              <a:scrgbClr r="0" g="0" b="0"/>
+            </a:effectRef>
+            <a:fontRef idx="minor">
+              <a:schemeClr val="dk1">
+                <a:hueOff val="0"/>
+                <a:satOff val="0"/>
+                <a:lumOff val="0"/>
+                <a:alphaOff val="0"/>
+              </a:schemeClr>
+            </a:fontRef>
+          </p:style>
+          <p:txBody>
+            <a:bodyPr spcFirstLastPara="0" vert="horz" wrap="square" lIns="106680" tIns="106680" rIns="142240" bIns="160020" numCol="1" spcCol="1270" anchor="t" anchorCtr="0">
+              <a:noAutofit/>
+            </a:bodyPr>
+            <a:lstStyle/>
+            <a:p>
+              <a:pPr marL="342900" lvl="1" indent="-342900" defTabSz="889000">
+                <a:lnSpc>
+                  <a:spcPct val="90000"/>
+                </a:lnSpc>
+                <a:spcBef>
+                  <a:spcPct val="0"/>
+                </a:spcBef>
+                <a:spcAft>
+                  <a:spcPct val="15000"/>
+                </a:spcAft>
+                <a:buFont typeface="Arial" panose="020B0604020202020204" pitchFamily="34" charset="0"/>
+                <a:buChar char="•"/>
+              </a:pPr>
+              <a:r>
+                <a:rPr lang="en-US" altLang="zh-CN" sz="2000" kern="1200" dirty="0"/>
+                <a:t>This</a:t>
+              </a:r>
+              <a:r>
+                <a:rPr lang="zh-CN" altLang="en-US" sz="2000" kern="1200" dirty="0"/>
+                <a:t> </a:t>
+              </a:r>
+              <a:r>
+                <a:rPr lang="en-US" altLang="zh-CN" sz="2000" kern="1200" dirty="0"/>
+                <a:t>is</a:t>
+              </a:r>
+              <a:r>
+                <a:rPr lang="zh-CN" altLang="en-US" sz="2000" kern="1200" dirty="0"/>
+                <a:t> </a:t>
+              </a:r>
+              <a:r>
+                <a:rPr lang="en-US" altLang="zh-CN" sz="2000" kern="1200" dirty="0"/>
+                <a:t>the</a:t>
+              </a:r>
+              <a:r>
+                <a:rPr lang="zh-CN" altLang="en-US" sz="2000" kern="1200" dirty="0"/>
+                <a:t> </a:t>
+              </a:r>
+              <a:r>
+                <a:rPr lang="en-US" altLang="zh-CN" sz="2000" kern="1200" dirty="0"/>
+                <a:t>post screen,</a:t>
+              </a:r>
+              <a:r>
+                <a:rPr lang="zh-CN" altLang="en-US" sz="2000" kern="1200" dirty="0"/>
+                <a:t> </a:t>
+              </a:r>
+              <a:r>
+                <a:rPr lang="en-US" altLang="zh-CN" sz="2000" kern="1200" dirty="0"/>
+                <a:t>which </a:t>
+              </a:r>
+              <a:r>
+                <a:rPr lang="en-US" altLang="zh-CN" sz="2000" dirty="0"/>
+                <a:t>contains input areas for </a:t>
+              </a:r>
+              <a:r>
+                <a:rPr lang="en-US" altLang="zh-CN" sz="2000" kern="1200" dirty="0"/>
+                <a:t>users to setup and post event info.</a:t>
+              </a:r>
+            </a:p>
+          </p:txBody>
+        </p:sp>
+      </p:grpSp>
+    </p:spTree>
+    <p:extLst>
+      <p:ext uri="{BB962C8B-B14F-4D97-AF65-F5344CB8AC3E}">
+        <p14:creationId xmlns:p14="http://schemas.microsoft.com/office/powerpoint/2010/main" val="1521606525"/>
+      </p:ext>
+    </p:extLst>
+  </p:cSld>
+  <p:clrMapOvr>
+    <a:masterClrMapping/>
+  </p:clrMapOvr>
+</p:sld>
+</file>
+
+<file path=ppt/slides/slide6.xml><?xml version="1.0" encoding="utf-8"?>
+<p:sld xmlns:a="http://schemas.openxmlformats.org/drawingml/2006/main" xmlns:r="http://schemas.openxmlformats.org/officeDocument/2006/relationships" xmlns:p="http://schemas.openxmlformats.org/presentationml/2006/main">
+  <p:cSld>
+    <p:spTree>
+      <p:nvGrpSpPr>
+        <p:cNvPr id="1" name=""/>
+        <p:cNvGrpSpPr/>
+        <p:nvPr/>
+      </p:nvGrpSpPr>
+      <p:grpSpPr>
+        <a:xfrm>
+          <a:off x="0" y="0"/>
+          <a:ext cx="0" cy="0"/>
+          <a:chOff x="0" y="0"/>
+          <a:chExt cx="0" cy="0"/>
+        </a:xfrm>
+      </p:grpSpPr>
+      <p:sp>
+        <p:nvSpPr>
+          <p:cNvPr id="2" name="Title 1">
+            <a:extLst>
+              <a:ext uri="{FF2B5EF4-FFF2-40B4-BE49-F238E27FC236}">
+                <a16:creationId xmlns:a16="http://schemas.microsoft.com/office/drawing/2014/main" id="{C46C4826-3193-197F-1BB3-C6D9998AAD1D}"/>
+              </a:ext>
+            </a:extLst>
+          </p:cNvPr>
+          <p:cNvSpPr>
+            <a:spLocks noGrp="1"/>
+          </p:cNvSpPr>
+          <p:nvPr>
+            <p:ph type="title"/>
+          </p:nvPr>
+        </p:nvSpPr>
+        <p:spPr/>
+        <p:txBody>
+          <a:bodyPr/>
+          <a:lstStyle/>
+          <a:p>
+            <a:r>
+              <a:rPr lang="en-US" altLang="zh-CN" dirty="0"/>
+              <a:t>Follower</a:t>
+            </a:r>
+            <a:r>
+              <a:rPr lang="zh-CN" altLang="en-US" dirty="0"/>
+              <a:t> </a:t>
+            </a:r>
+            <a:r>
+              <a:rPr lang="en-US" altLang="zh-CN" dirty="0"/>
+              <a:t>Manager</a:t>
+            </a:r>
+            <a:r>
+              <a:rPr lang="zh-CN" altLang="en-US" dirty="0"/>
+              <a:t> </a:t>
+            </a:r>
+            <a:r>
+              <a:rPr lang="en-US" altLang="zh-CN" dirty="0"/>
+              <a:t>Screen</a:t>
+            </a:r>
+            <a:endParaRPr lang="en-US" dirty="0"/>
+          </a:p>
+        </p:txBody>
+      </p:sp>
+      <p:pic>
+        <p:nvPicPr>
+          <p:cNvPr id="3" name="Picture 2">
+            <a:extLst>
+              <a:ext uri="{FF2B5EF4-FFF2-40B4-BE49-F238E27FC236}">
+                <a16:creationId xmlns:a16="http://schemas.microsoft.com/office/drawing/2014/main" id="{E288D800-E77B-F8DB-7677-99CC02C7DBD9}"/>
+              </a:ext>
+            </a:extLst>
+          </p:cNvPr>
+          <p:cNvPicPr>
+            <a:picLocks noChangeAspect="1"/>
+          </p:cNvPicPr>
+          <p:nvPr/>
+        </p:nvPicPr>
+        <p:blipFill>
+          <a:blip r:embed="rId2"/>
+          <a:stretch>
+            <a:fillRect/>
+          </a:stretch>
+        </p:blipFill>
+        <p:spPr>
+          <a:xfrm>
+            <a:off x="516007" y="1510748"/>
+            <a:ext cx="2563368" cy="4449064"/>
+          </a:xfrm>
+          <a:prstGeom prst="rect">
+            <a:avLst/>
+          </a:prstGeom>
+        </p:spPr>
+      </p:pic>
+      <p:pic>
+        <p:nvPicPr>
+          <p:cNvPr id="4" name="Picture 3">
+            <a:extLst>
+              <a:ext uri="{FF2B5EF4-FFF2-40B4-BE49-F238E27FC236}">
+                <a16:creationId xmlns:a16="http://schemas.microsoft.com/office/drawing/2014/main" id="{FA9D1664-43D5-3024-7F93-67FBF11FAC59}"/>
+              </a:ext>
+            </a:extLst>
+          </p:cNvPr>
+          <p:cNvPicPr>
+            <a:picLocks noChangeAspect="1"/>
+          </p:cNvPicPr>
+          <p:nvPr/>
+        </p:nvPicPr>
+        <p:blipFill>
+          <a:blip r:embed="rId3"/>
+          <a:stretch>
+            <a:fillRect/>
+          </a:stretch>
+        </p:blipFill>
+        <p:spPr>
+          <a:xfrm>
+            <a:off x="3417924" y="1470962"/>
+            <a:ext cx="2562461" cy="4488850"/>
+          </a:xfrm>
+          <a:prstGeom prst="rect">
+            <a:avLst/>
+          </a:prstGeom>
+        </p:spPr>
+      </p:pic>
+      <p:sp>
+        <p:nvSpPr>
+          <p:cNvPr id="5" name="TextBox 4">
+            <a:extLst>
+              <a:ext uri="{FF2B5EF4-FFF2-40B4-BE49-F238E27FC236}">
+                <a16:creationId xmlns:a16="http://schemas.microsoft.com/office/drawing/2014/main" id="{642C62AF-0C69-5A86-0980-3958039E843D}"/>
+              </a:ext>
+            </a:extLst>
+          </p:cNvPr>
+          <p:cNvSpPr txBox="1"/>
+          <p:nvPr/>
+        </p:nvSpPr>
+        <p:spPr>
+          <a:xfrm>
+            <a:off x="925901" y="3646950"/>
+            <a:ext cx="1515640" cy="369332"/>
+          </a:xfrm>
+          <a:prstGeom prst="rect">
+            <a:avLst/>
+          </a:prstGeom>
+          <a:noFill/>
+        </p:spPr>
+        <p:txBody>
+          <a:bodyPr wrap="square" rtlCol="0">
+            <a:spAutoFit/>
+          </a:bodyPr>
+          <a:lstStyle/>
+          <a:p>
+            <a:r>
+              <a:rPr lang="en-US" altLang="zh-CN" dirty="0"/>
+              <a:t>Recycler</a:t>
+            </a:r>
+            <a:r>
+              <a:rPr lang="zh-CN" altLang="en-US" dirty="0"/>
+              <a:t> </a:t>
+            </a:r>
+            <a:r>
+              <a:rPr lang="en-US" altLang="zh-CN" dirty="0"/>
+              <a:t>View</a:t>
+            </a:r>
+            <a:endParaRPr lang="en-US" dirty="0"/>
+          </a:p>
+        </p:txBody>
+      </p:sp>
+      <p:sp>
+        <p:nvSpPr>
+          <p:cNvPr id="6" name="TextBox 5">
+            <a:extLst>
+              <a:ext uri="{FF2B5EF4-FFF2-40B4-BE49-F238E27FC236}">
+                <a16:creationId xmlns:a16="http://schemas.microsoft.com/office/drawing/2014/main" id="{13A3636C-5410-69D8-A108-6CDC5C5254CC}"/>
+              </a:ext>
+            </a:extLst>
+          </p:cNvPr>
+          <p:cNvSpPr txBox="1"/>
+          <p:nvPr/>
+        </p:nvSpPr>
+        <p:spPr>
+          <a:xfrm>
+            <a:off x="3849968" y="3646950"/>
+            <a:ext cx="1699494" cy="646331"/>
+          </a:xfrm>
+          <a:prstGeom prst="rect">
+            <a:avLst/>
+          </a:prstGeom>
+          <a:noFill/>
+        </p:spPr>
+        <p:txBody>
+          <a:bodyPr wrap="square" rtlCol="0">
+            <a:spAutoFit/>
+          </a:bodyPr>
+          <a:lstStyle/>
+          <a:p>
+            <a:r>
+              <a:rPr lang="en-US" altLang="zh-CN" dirty="0"/>
+              <a:t>One</a:t>
+            </a:r>
+            <a:r>
+              <a:rPr lang="zh-CN" altLang="en-US" dirty="0"/>
+              <a:t> </a:t>
+            </a:r>
+            <a:r>
+              <a:rPr lang="en-US" altLang="zh-CN" dirty="0"/>
+              <a:t>row</a:t>
+            </a:r>
+            <a:r>
+              <a:rPr lang="zh-CN" altLang="en-US" dirty="0"/>
+              <a:t> </a:t>
+            </a:r>
+            <a:r>
+              <a:rPr lang="en-US" altLang="zh-CN" dirty="0"/>
+              <a:t>in</a:t>
+            </a:r>
+            <a:r>
+              <a:rPr lang="zh-CN" altLang="en-US" dirty="0"/>
+              <a:t> </a:t>
+            </a:r>
+            <a:r>
+              <a:rPr lang="en-US" altLang="zh-CN" dirty="0"/>
+              <a:t>the</a:t>
+            </a:r>
+            <a:r>
+              <a:rPr lang="zh-CN" altLang="en-US" dirty="0"/>
+              <a:t> </a:t>
+            </a:r>
+            <a:r>
+              <a:rPr lang="en-US" altLang="zh-CN" dirty="0"/>
+              <a:t>Recycler</a:t>
+            </a:r>
+            <a:r>
+              <a:rPr lang="zh-CN" altLang="en-US" dirty="0"/>
+              <a:t> </a:t>
+            </a:r>
+            <a:r>
+              <a:rPr lang="en-US" altLang="zh-CN" dirty="0"/>
+              <a:t>View</a:t>
+            </a:r>
+            <a:endParaRPr lang="en-US" dirty="0"/>
+          </a:p>
+        </p:txBody>
+      </p:sp>
+      <p:grpSp>
+        <p:nvGrpSpPr>
+          <p:cNvPr id="7" name="Group 6">
+            <a:extLst>
+              <a:ext uri="{FF2B5EF4-FFF2-40B4-BE49-F238E27FC236}">
+                <a16:creationId xmlns:a16="http://schemas.microsoft.com/office/drawing/2014/main" id="{A22A1D45-7F4E-FEA6-CF2F-6FE7F0F2E71D}"/>
+              </a:ext>
+            </a:extLst>
+          </p:cNvPr>
+          <p:cNvGrpSpPr/>
+          <p:nvPr/>
+        </p:nvGrpSpPr>
+        <p:grpSpPr>
+          <a:xfrm>
+            <a:off x="6400973" y="1490855"/>
+            <a:ext cx="5159461" cy="4449064"/>
+            <a:chOff x="2539" y="1777233"/>
+            <a:chExt cx="2476500" cy="2854800"/>
+          </a:xfrm>
+        </p:grpSpPr>
+        <p:sp>
+          <p:nvSpPr>
+            <p:cNvPr id="8" name="Rectangle 7">
+              <a:extLst>
+                <a:ext uri="{FF2B5EF4-FFF2-40B4-BE49-F238E27FC236}">
+                  <a16:creationId xmlns:a16="http://schemas.microsoft.com/office/drawing/2014/main" id="{64914826-C500-B00A-8AD5-5F496EE39C0F}"/>
+                </a:ext>
+              </a:extLst>
+            </p:cNvPr>
+            <p:cNvSpPr/>
+            <p:nvPr/>
+          </p:nvSpPr>
+          <p:spPr>
+            <a:xfrm>
+              <a:off x="2539" y="1777233"/>
+              <a:ext cx="2476500" cy="2854800"/>
+            </a:xfrm>
+            <a:prstGeom prst="rect">
+              <a:avLst/>
+            </a:prstGeom>
+          </p:spPr>
+          <p:style>
+            <a:lnRef idx="2">
+              <a:schemeClr val="accent1">
+                <a:alpha val="90000"/>
+                <a:tint val="40000"/>
+                <a:hueOff val="0"/>
+                <a:satOff val="0"/>
+                <a:lumOff val="0"/>
+                <a:alphaOff val="0"/>
+              </a:schemeClr>
+            </a:lnRef>
+            <a:fillRef idx="1">
+              <a:schemeClr val="accent1">
+                <a:alpha val="90000"/>
+                <a:tint val="40000"/>
+                <a:hueOff val="0"/>
+                <a:satOff val="0"/>
+                <a:lumOff val="0"/>
+                <a:alphaOff val="0"/>
+              </a:schemeClr>
+            </a:fillRef>
+            <a:effectRef idx="0">
+              <a:schemeClr val="accent1">
+                <a:alpha val="90000"/>
+                <a:tint val="40000"/>
+                <a:hueOff val="0"/>
+                <a:satOff val="0"/>
+                <a:lumOff val="0"/>
+                <a:alphaOff val="0"/>
+              </a:schemeClr>
+            </a:effectRef>
+            <a:fontRef idx="minor">
+              <a:schemeClr val="dk1">
+                <a:hueOff val="0"/>
+                <a:satOff val="0"/>
+                <a:lumOff val="0"/>
+                <a:alphaOff val="0"/>
+              </a:schemeClr>
+            </a:fontRef>
+          </p:style>
+        </p:sp>
+        <p:sp>
+          <p:nvSpPr>
+            <p:cNvPr id="9" name="TextBox 8">
+              <a:extLst>
+                <a:ext uri="{FF2B5EF4-FFF2-40B4-BE49-F238E27FC236}">
+                  <a16:creationId xmlns:a16="http://schemas.microsoft.com/office/drawing/2014/main" id="{CEC59AB9-40CC-EAC0-F975-7D628F4B34AF}"/>
+                </a:ext>
+              </a:extLst>
+            </p:cNvPr>
+            <p:cNvSpPr txBox="1"/>
+            <p:nvPr/>
+          </p:nvSpPr>
+          <p:spPr>
+            <a:xfrm>
+              <a:off x="2539" y="1777233"/>
+              <a:ext cx="2476500" cy="2854800"/>
+            </a:xfrm>
+            <a:prstGeom prst="rect">
+              <a:avLst/>
+            </a:prstGeom>
+          </p:spPr>
+          <p:style>
+            <a:lnRef idx="0">
+              <a:scrgbClr r="0" g="0" b="0"/>
+            </a:lnRef>
+            <a:fillRef idx="0">
+              <a:scrgbClr r="0" g="0" b="0"/>
+            </a:fillRef>
+            <a:effectRef idx="0">
+              <a:scrgbClr r="0" g="0" b="0"/>
+            </a:effectRef>
+            <a:fontRef idx="minor">
+              <a:schemeClr val="dk1">
+                <a:hueOff val="0"/>
+                <a:satOff val="0"/>
+                <a:lumOff val="0"/>
+                <a:alphaOff val="0"/>
+              </a:schemeClr>
+            </a:fontRef>
+          </p:style>
+          <p:txBody>
+            <a:bodyPr spcFirstLastPara="0" vert="horz" wrap="square" lIns="106680" tIns="106680" rIns="142240" bIns="160020" numCol="1" spcCol="1270" anchor="t" anchorCtr="0">
+              <a:noAutofit/>
+            </a:bodyPr>
+            <a:lstStyle/>
+            <a:p>
+              <a:pPr marL="342900" lvl="1" indent="-342900" defTabSz="889000">
+                <a:lnSpc>
+                  <a:spcPct val="90000"/>
+                </a:lnSpc>
+                <a:spcBef>
+                  <a:spcPct val="0"/>
+                </a:spcBef>
+                <a:spcAft>
+                  <a:spcPct val="15000"/>
+                </a:spcAft>
+                <a:buFont typeface="Arial" panose="020B0604020202020204" pitchFamily="34" charset="0"/>
+                <a:buChar char="•"/>
+              </a:pPr>
+              <a:r>
+                <a:rPr lang="en-US" altLang="zh-CN" sz="2000" kern="1200" dirty="0"/>
+                <a:t>This</a:t>
+              </a:r>
+              <a:r>
+                <a:rPr lang="zh-CN" altLang="en-US" sz="2000" kern="1200" dirty="0"/>
+                <a:t> </a:t>
+              </a:r>
+              <a:r>
+                <a:rPr lang="en-US" altLang="zh-CN" sz="2000" kern="1200" dirty="0"/>
+                <a:t>is</a:t>
+              </a:r>
+              <a:r>
+                <a:rPr lang="zh-CN" altLang="en-US" sz="2000" kern="1200" dirty="0"/>
+                <a:t> </a:t>
+              </a:r>
+              <a:r>
+                <a:rPr lang="en-US" altLang="zh-CN" sz="2000" kern="1200" dirty="0"/>
+                <a:t>the</a:t>
+              </a:r>
+              <a:r>
+                <a:rPr lang="zh-CN" altLang="en-US" sz="2000" kern="1200" dirty="0"/>
+                <a:t> </a:t>
+              </a:r>
+              <a:r>
+                <a:rPr lang="en-US" altLang="zh-CN" sz="2000" kern="1200" dirty="0"/>
+                <a:t>Follower/Following</a:t>
+              </a:r>
+              <a:r>
+                <a:rPr lang="zh-CN" altLang="en-US" sz="2000" kern="1200" dirty="0"/>
+                <a:t> </a:t>
+              </a:r>
+              <a:r>
+                <a:rPr lang="en-US" altLang="zh-CN" sz="2000" kern="1200" dirty="0"/>
+                <a:t>manager</a:t>
+              </a:r>
+              <a:r>
+                <a:rPr lang="zh-CN" altLang="en-US" sz="2000" kern="1200" dirty="0"/>
+                <a:t> </a:t>
+              </a:r>
+              <a:r>
+                <a:rPr lang="en-US" altLang="zh-CN" sz="2000" kern="1200" dirty="0"/>
+                <a:t>screen,</a:t>
+              </a:r>
+              <a:r>
+                <a:rPr lang="zh-CN" altLang="en-US" sz="2000" kern="1200" dirty="0"/>
+                <a:t> </a:t>
+              </a:r>
+              <a:r>
+                <a:rPr lang="en-US" altLang="zh-CN" sz="2000" kern="1200" dirty="0"/>
+                <a:t>which contains a list of followers/following</a:t>
+              </a:r>
+              <a:r>
+                <a:rPr lang="zh-CN" altLang="en-US" sz="2000" kern="1200" dirty="0"/>
+                <a:t> </a:t>
+              </a:r>
+              <a:r>
+                <a:rPr lang="en-US" altLang="zh-CN" sz="2000" kern="1200" dirty="0"/>
+                <a:t>users. </a:t>
+              </a:r>
+            </a:p>
+            <a:p>
+              <a:pPr marL="0" lvl="1" defTabSz="889000">
+                <a:lnSpc>
+                  <a:spcPct val="90000"/>
+                </a:lnSpc>
+                <a:spcBef>
+                  <a:spcPct val="0"/>
+                </a:spcBef>
+                <a:spcAft>
+                  <a:spcPct val="15000"/>
+                </a:spcAft>
+              </a:pPr>
+              <a:endParaRPr lang="en-US" altLang="zh-CN" sz="2000" kern="1200" dirty="0"/>
+            </a:p>
+            <a:p>
+              <a:pPr marL="342900" lvl="1" indent="-342900" defTabSz="889000">
+                <a:lnSpc>
+                  <a:spcPct val="90000"/>
+                </a:lnSpc>
+                <a:spcBef>
+                  <a:spcPct val="0"/>
+                </a:spcBef>
+                <a:spcAft>
+                  <a:spcPct val="15000"/>
+                </a:spcAft>
+                <a:buFont typeface="Arial" panose="020B0604020202020204" pitchFamily="34" charset="0"/>
+                <a:buChar char="•"/>
+              </a:pPr>
+              <a:r>
+                <a:rPr lang="en-US" altLang="zh-CN" sz="2000" kern="1200" dirty="0"/>
                 <a:t>We will build the list using </a:t>
               </a:r>
               <a:r>
@@ -8070,7 +9483,7 @@
 </p:sld>
 </file>
 
-<file path=ppt/slides/slide4.xml><?xml version="1.0" encoding="utf-8"?>
+<file path=ppt/slides/slide7.xml><?xml version="1.0" encoding="utf-8"?>
 <p:sld xmlns:a="http://schemas.openxmlformats.org/drawingml/2006/main" xmlns:r="http://schemas.openxmlformats.org/officeDocument/2006/relationships" xmlns:p="http://schemas.openxmlformats.org/presentationml/2006/main">
   <p:cSld>
     <p:spTree>
@@ -8908,7 +10321,7 @@
 </p:sld>
 </file>
 
-<file path=ppt/slides/slide5.xml><?xml version="1.0" encoding="utf-8"?>
+<file path=ppt/slides/slide8.xml><?xml version="1.0" encoding="utf-8"?>
 <p:sld xmlns:a="http://schemas.openxmlformats.org/drawingml/2006/main" xmlns:r="http://schemas.openxmlformats.org/officeDocument/2006/relationships" xmlns:p="http://schemas.openxmlformats.org/presentationml/2006/main">
   <p:cSld>
     <p:spTree>

</xml_diff>

<commit_message>
Add screen count to PPT
</commit_message>
<xml_diff>
--- a/UniVerse_Project Front End.pptx
+++ b/UniVerse_Project Front End.pptx
@@ -8820,7 +8820,7 @@
             </a:bodyPr>
             <a:lstStyle/>
             <a:p>
-              <a:pPr marL="342900" lvl="1" indent="-342900" defTabSz="889000">
+              <a:pPr marL="0" lvl="1" defTabSz="889000">
                 <a:lnSpc>
                   <a:spcPct val="90000"/>
                 </a:lnSpc>
@@ -8830,8 +8830,6 @@
                 <a:spcAft>
                   <a:spcPct val="15000"/>
                 </a:spcAft>
-                <a:buFont typeface="Arial" panose="020B0604020202020204" pitchFamily="34" charset="0"/>
-                <a:buChar char="•"/>
               </a:pPr>
               <a:r>
                 <a:rPr lang="en-US" altLang="zh-CN" kern="1200" dirty="0"/>
@@ -8867,7 +8865,7 @@
               </a:r>
               <a:r>
                 <a:rPr lang="en-US" altLang="zh-CN" kern="1200" dirty="0"/>
-                <a:t>xx</a:t>
+                <a:t>10</a:t>
               </a:r>
               <a:r>
                 <a:rPr lang="zh-CN" altLang="en-US" kern="1200" dirty="0"/>
@@ -8926,7 +8924,26 @@
               </a:pPr>
               <a:r>
                 <a:rPr lang="en-US" altLang="zh-CN" dirty="0"/>
-                <a:t>Login/Register screen</a:t>
+                <a:t>Login screen</a:t>
+              </a:r>
+            </a:p>
+            <a:p>
+              <a:pPr marL="342900" lvl="1" indent="-342900" defTabSz="889000">
+                <a:lnSpc>
+                  <a:spcPct val="90000"/>
+                </a:lnSpc>
+                <a:spcBef>
+                  <a:spcPct val="0"/>
+                </a:spcBef>
+                <a:spcAft>
+                  <a:spcPct val="15000"/>
+                </a:spcAft>
+                <a:buFont typeface="Arial" panose="020B0604020202020204" pitchFamily="34" charset="0"/>
+                <a:buChar char="•"/>
+              </a:pPr>
+              <a:r>
+                <a:rPr lang="en-US" altLang="zh-CN" dirty="0"/>
+                <a:t>Register screen</a:t>
               </a:r>
             </a:p>
             <a:p>

</xml_diff>